<commit_message>
Fixed bot_battle to correctly show winner. Edited recursive_tree in elfgame_DP to reduce the search space, by setting wood_elf_count = 0.
</commit_message>
<xml_diff>
--- a/Solving the Elf Game.pptx
+++ b/Solving the Elf Game.pptx
@@ -266,7 +266,7 @@
           <a:p>
             <a:fld id="{14A1E53D-6E13-4EA0-998B-E174A21AA628}" type="datetimeFigureOut">
               <a:rPr lang="en-GB" smtClean="0"/>
-              <a:t>13/12/2016</a:t>
+              <a:t>14/12/2016</a:t>
             </a:fld>
             <a:endParaRPr lang="en-GB"/>
           </a:p>
@@ -436,7 +436,7 @@
           <a:p>
             <a:fld id="{14A1E53D-6E13-4EA0-998B-E174A21AA628}" type="datetimeFigureOut">
               <a:rPr lang="en-GB" smtClean="0"/>
-              <a:t>13/12/2016</a:t>
+              <a:t>14/12/2016</a:t>
             </a:fld>
             <a:endParaRPr lang="en-GB"/>
           </a:p>
@@ -616,7 +616,7 @@
           <a:p>
             <a:fld id="{14A1E53D-6E13-4EA0-998B-E174A21AA628}" type="datetimeFigureOut">
               <a:rPr lang="en-GB" smtClean="0"/>
-              <a:t>13/12/2016</a:t>
+              <a:t>14/12/2016</a:t>
             </a:fld>
             <a:endParaRPr lang="en-GB"/>
           </a:p>
@@ -786,7 +786,7 @@
           <a:p>
             <a:fld id="{14A1E53D-6E13-4EA0-998B-E174A21AA628}" type="datetimeFigureOut">
               <a:rPr lang="en-GB" smtClean="0"/>
-              <a:t>13/12/2016</a:t>
+              <a:t>14/12/2016</a:t>
             </a:fld>
             <a:endParaRPr lang="en-GB"/>
           </a:p>
@@ -1032,7 +1032,7 @@
           <a:p>
             <a:fld id="{14A1E53D-6E13-4EA0-998B-E174A21AA628}" type="datetimeFigureOut">
               <a:rPr lang="en-GB" smtClean="0"/>
-              <a:t>13/12/2016</a:t>
+              <a:t>14/12/2016</a:t>
             </a:fld>
             <a:endParaRPr lang="en-GB"/>
           </a:p>
@@ -1264,7 +1264,7 @@
           <a:p>
             <a:fld id="{14A1E53D-6E13-4EA0-998B-E174A21AA628}" type="datetimeFigureOut">
               <a:rPr lang="en-GB" smtClean="0"/>
-              <a:t>13/12/2016</a:t>
+              <a:t>14/12/2016</a:t>
             </a:fld>
             <a:endParaRPr lang="en-GB"/>
           </a:p>
@@ -1631,7 +1631,7 @@
           <a:p>
             <a:fld id="{14A1E53D-6E13-4EA0-998B-E174A21AA628}" type="datetimeFigureOut">
               <a:rPr lang="en-GB" smtClean="0"/>
-              <a:t>13/12/2016</a:t>
+              <a:t>14/12/2016</a:t>
             </a:fld>
             <a:endParaRPr lang="en-GB"/>
           </a:p>
@@ -1749,7 +1749,7 @@
           <a:p>
             <a:fld id="{14A1E53D-6E13-4EA0-998B-E174A21AA628}" type="datetimeFigureOut">
               <a:rPr lang="en-GB" smtClean="0"/>
-              <a:t>13/12/2016</a:t>
+              <a:t>14/12/2016</a:t>
             </a:fld>
             <a:endParaRPr lang="en-GB"/>
           </a:p>
@@ -1844,7 +1844,7 @@
           <a:p>
             <a:fld id="{14A1E53D-6E13-4EA0-998B-E174A21AA628}" type="datetimeFigureOut">
               <a:rPr lang="en-GB" smtClean="0"/>
-              <a:t>13/12/2016</a:t>
+              <a:t>14/12/2016</a:t>
             </a:fld>
             <a:endParaRPr lang="en-GB"/>
           </a:p>
@@ -2121,7 +2121,7 @@
           <a:p>
             <a:fld id="{14A1E53D-6E13-4EA0-998B-E174A21AA628}" type="datetimeFigureOut">
               <a:rPr lang="en-GB" smtClean="0"/>
-              <a:t>13/12/2016</a:t>
+              <a:t>14/12/2016</a:t>
             </a:fld>
             <a:endParaRPr lang="en-GB"/>
           </a:p>
@@ -2374,7 +2374,7 @@
           <a:p>
             <a:fld id="{14A1E53D-6E13-4EA0-998B-E174A21AA628}" type="datetimeFigureOut">
               <a:rPr lang="en-GB" smtClean="0"/>
-              <a:t>13/12/2016</a:t>
+              <a:t>14/12/2016</a:t>
             </a:fld>
             <a:endParaRPr lang="en-GB"/>
           </a:p>
@@ -2587,7 +2587,7 @@
           <a:p>
             <a:fld id="{14A1E53D-6E13-4EA0-998B-E174A21AA628}" type="datetimeFigureOut">
               <a:rPr lang="en-GB" smtClean="0"/>
-              <a:t>13/12/2016</a:t>
+              <a:t>14/12/2016</a:t>
             </a:fld>
             <a:endParaRPr lang="en-GB"/>
           </a:p>
@@ -3035,7 +3035,23 @@
           <a:bodyPr/>
           <a:lstStyle/>
           <a:p>
-            <a:endParaRPr lang="en-GB"/>
+            <a:r>
+              <a:rPr lang="en-GB" dirty="0" smtClean="0"/>
+              <a:t>Github.com/</a:t>
+            </a:r>
+            <a:r>
+              <a:rPr lang="en-GB" dirty="0" err="1" smtClean="0"/>
+              <a:t>tmerrittsmith</a:t>
+            </a:r>
+            <a:r>
+              <a:rPr lang="en-GB" dirty="0" smtClean="0"/>
+              <a:t>/</a:t>
+            </a:r>
+            <a:r>
+              <a:rPr lang="en-GB" dirty="0" err="1" smtClean="0"/>
+              <a:t>elf_game</a:t>
+            </a:r>
+            <a:endParaRPr lang="en-GB" dirty="0"/>
           </a:p>
         </p:txBody>
       </p:sp>
@@ -3333,6 +3349,13 @@
   <p:clrMapOvr>
     <a:masterClrMapping/>
   </p:clrMapOvr>
+  <p:timing>
+    <p:tnLst>
+      <p:par>
+        <p:cTn id="1" dur="indefinite" restart="never" nodeType="tmRoot"/>
+      </p:par>
+    </p:tnLst>
+  </p:timing>
 </p:sld>
 </file>
 
@@ -3454,6 +3477,13 @@
   <p:clrMapOvr>
     <a:masterClrMapping/>
   </p:clrMapOvr>
+  <p:timing>
+    <p:tnLst>
+      <p:par>
+        <p:cTn id="1" dur="indefinite" restart="never" nodeType="tmRoot"/>
+      </p:par>
+    </p:tnLst>
+  </p:timing>
 </p:sld>
 </file>
 
@@ -4602,6 +4632,13 @@
   <p:clrMapOvr>
     <a:masterClrMapping/>
   </p:clrMapOvr>
+  <p:timing>
+    <p:tnLst>
+      <p:par>
+        <p:cTn id="1" dur="indefinite" restart="never" nodeType="tmRoot"/>
+      </p:par>
+    </p:tnLst>
+  </p:timing>
 </p:sld>
 </file>
 
@@ -4776,6 +4813,13 @@
   <p:clrMapOvr>
     <a:masterClrMapping/>
   </p:clrMapOvr>
+  <p:timing>
+    <p:tnLst>
+      <p:par>
+        <p:cTn id="1" dur="indefinite" restart="never" nodeType="tmRoot"/>
+      </p:par>
+    </p:tnLst>
+  </p:timing>
 </p:sld>
 </file>
 
@@ -5127,6 +5171,13 @@
   <p:clrMapOvr>
     <a:masterClrMapping/>
   </p:clrMapOvr>
+  <p:timing>
+    <p:tnLst>
+      <p:par>
+        <p:cTn id="1" dur="indefinite" restart="never" nodeType="tmRoot"/>
+      </p:par>
+    </p:tnLst>
+  </p:timing>
 </p:sld>
 </file>
 
@@ -5265,6 +5316,13 @@
   <p:clrMapOvr>
     <a:masterClrMapping/>
   </p:clrMapOvr>
+  <p:timing>
+    <p:tnLst>
+      <p:par>
+        <p:cTn id="1" dur="indefinite" restart="never" nodeType="tmRoot"/>
+      </p:par>
+    </p:tnLst>
+  </p:timing>
 </p:sld>
 </file>
 
@@ -5832,6 +5890,13 @@
   <p:clrMapOvr>
     <a:masterClrMapping/>
   </p:clrMapOvr>
+  <p:timing>
+    <p:tnLst>
+      <p:par>
+        <p:cTn id="1" dur="indefinite" restart="never" nodeType="tmRoot"/>
+      </p:par>
+    </p:tnLst>
+  </p:timing>
 </p:sld>
 </file>
 
@@ -6212,6 +6277,13 @@
   <p:clrMapOvr>
     <a:masterClrMapping/>
   </p:clrMapOvr>
+  <p:timing>
+    <p:tnLst>
+      <p:par>
+        <p:cTn id="1" dur="indefinite" restart="never" nodeType="tmRoot"/>
+      </p:par>
+    </p:tnLst>
+  </p:timing>
 </p:sld>
 </file>
 
@@ -7179,6 +7251,13 @@
   <p:clrMapOvr>
     <a:masterClrMapping/>
   </p:clrMapOvr>
+  <p:timing>
+    <p:tnLst>
+      <p:par>
+        <p:cTn id="1" dur="indefinite" restart="never" nodeType="tmRoot"/>
+      </p:par>
+    </p:tnLst>
+  </p:timing>
 </p:sld>
 </file>
 

</xml_diff>